<commit_message>
added chapter2 files and updates
</commit_message>
<xml_diff>
--- a/Chapter1/Adam_Ercanbrack_DDS_Unit1_Assignment_08212023.pptx
+++ b/Chapter1/Adam_Ercanbrack_DDS_Unit1_Assignment_08212023.pptx
@@ -231,7 +231,7 @@
           <a:p>
             <a:fld id="{80680FBE-A8DF-4758-9AC4-3A9E1039168F}" type="datetimeFigureOut">
               <a:rPr lang="en-US" smtClean="0"/>
-              <a:t>8/16/2023</a:t>
+              <a:t>8/17/2023</a:t>
             </a:fld>
             <a:endParaRPr lang="en-US"/>
           </a:p>
@@ -396,7 +396,7 @@
           <a:p>
             <a:fld id="{EC13577B-6902-467D-A26C-08A0DD5E4E03}" type="datetimeFigureOut">
               <a:rPr lang="en-US" smtClean="0"/>
-              <a:t>8/16/2023</a:t>
+              <a:t>8/17/2023</a:t>
             </a:fld>
             <a:endParaRPr lang="en-US"/>
           </a:p>
@@ -883,7 +883,7 @@
             <a:fld id="{8BEEBAAA-29B5-4AF5-BC5F-7E580C29002D}" type="datetimeFigureOut">
               <a:rPr lang="en-US" smtClean="0"/>
               <a:pPr/>
-              <a:t>8/16/2023</a:t>
+              <a:t>8/17/2023</a:t>
             </a:fld>
             <a:endParaRPr lang="en-US"/>
           </a:p>
@@ -1088,7 +1088,7 @@
             <a:fld id="{8BEEBAAA-29B5-4AF5-BC5F-7E580C29002D}" type="datetimeFigureOut">
               <a:rPr lang="en-US" smtClean="0"/>
               <a:pPr/>
-              <a:t>8/16/2023</a:t>
+              <a:t>8/17/2023</a:t>
             </a:fld>
             <a:endParaRPr lang="en-US"/>
           </a:p>
@@ -1355,7 +1355,7 @@
             <a:fld id="{8BEEBAAA-29B5-4AF5-BC5F-7E580C29002D}" type="datetimeFigureOut">
               <a:rPr lang="en-US" smtClean="0"/>
               <a:pPr/>
-              <a:t>8/16/2023</a:t>
+              <a:t>8/17/2023</a:t>
             </a:fld>
             <a:endParaRPr lang="en-US"/>
           </a:p>
@@ -1560,7 +1560,7 @@
             <a:fld id="{8BEEBAAA-29B5-4AF5-BC5F-7E580C29002D}" type="datetimeFigureOut">
               <a:rPr lang="en-US" smtClean="0"/>
               <a:pPr/>
-              <a:t>8/16/2023</a:t>
+              <a:t>8/17/2023</a:t>
             </a:fld>
             <a:endParaRPr lang="en-US"/>
           </a:p>
@@ -1860,7 +1860,7 @@
           <a:p>
             <a:fld id="{C9044792-365C-4452-8F5F-DF3FF6A6B925}" type="datetimeFigureOut">
               <a:rPr lang="en-US" smtClean="0"/>
-              <a:t>8/16/2023</a:t>
+              <a:t>8/17/2023</a:t>
             </a:fld>
             <a:endParaRPr lang="en-US"/>
           </a:p>
@@ -2115,7 +2115,7 @@
             <a:fld id="{8BEEBAAA-29B5-4AF5-BC5F-7E580C29002D}" type="datetimeFigureOut">
               <a:rPr lang="en-US" smtClean="0"/>
               <a:pPr/>
-              <a:t>8/16/2023</a:t>
+              <a:t>8/17/2023</a:t>
             </a:fld>
             <a:endParaRPr lang="en-US"/>
           </a:p>
@@ -3231,7 +3231,7 @@
         </p:spPr>
         <p:txBody>
           <a:bodyPr>
-            <a:normAutofit fontScale="70000" lnSpcReduction="20000"/>
+            <a:normAutofit fontScale="77500" lnSpcReduction="20000"/>
           </a:bodyPr>
           <a:lstStyle/>
           <a:p>
@@ -3261,7 +3261,7 @@
             </a:pPr>
             <a:r>
               <a:rPr lang="en-US" dirty="0"/>
-              <a:t>Mean = 1.999041  	                                      Standard Deviation = 2.000401</a:t>
+              <a:t>What is the mean and standard deviation?           Mean = 1.999041  	                                      Standard Deviation = 2.000401</a:t>
             </a:r>
           </a:p>
           <a:p>
@@ -3271,7 +3271,7 @@
             </a:pPr>
             <a:r>
               <a:rPr lang="en-US" dirty="0"/>
-              <a:t>According to the central limit theorem a sample mean with a size ≤ 30 should have a normal distribution. (See figure 3). The mean of the size 50 sample was 2.005591, with a standard deviation of 0.2827237 reflecting this more normal distribution.</a:t>
+              <a:t>According to the central limit theorem a sample mean with a size ≥ 30 should have a normal distribution. (See figure 3). Since the sample was size 50 it should have a normal distribution. When tested, the sample had a mean of 2.005591, with a standard deviation of 0.2827237 reflecting this more normal distribution.</a:t>
             </a:r>
           </a:p>
           <a:p>
@@ -3292,19 +3292,6 @@
             <a:r>
               <a:rPr lang="en-US" dirty="0"/>
               <a:t>Sample mean 1 = 2.004404.                                Standard Deviation 1 = 0.05258683.                                                         Sample mean 2 = 2.003828.                                Standard Deviation 2 = 0.04011342. </a:t>
-            </a:r>
-          </a:p>
-          <a:p>
-            <a:pPr marL="342900" indent="-342900">
-              <a:buFont typeface="+mj-lt"/>
-              <a:buAutoNum type="arabicPeriod"/>
-            </a:pPr>
-            <a:endParaRPr lang="en-US" dirty="0"/>
-          </a:p>
-          <a:p>
-            <a:r>
-              <a:rPr lang="en-US" dirty="0"/>
-              <a:t>	</a:t>
             </a:r>
           </a:p>
         </p:txBody>
@@ -5942,7 +5929,7 @@
         <p:spPr>
           <a:xfrm>
             <a:off x="444500" y="1359253"/>
-            <a:ext cx="3878925" cy="4943891"/>
+            <a:ext cx="3878925" cy="5325632"/>
           </a:xfrm>
         </p:spPr>
         <p:txBody>
@@ -5963,7 +5950,22 @@
             </a:pPr>
             <a:r>
               <a:rPr lang="en-US" dirty="0"/>
-              <a:t> Step 1: H0: Beach Comber patrons' ages are, on average, equal to 21. Ha: Beach Comber patrons' ages are, on average, not equal to 21. </a:t>
+              <a:t> Step 1: </a:t>
+            </a:r>
+            <a:r>
+              <a:rPr lang="en-US" b="1" kern="0" dirty="0">
+                <a:effectLst/>
+                <a:ea typeface="Times New Roman" panose="02020603050405020304" pitchFamily="18" charset="0"/>
+              </a:rPr>
+              <a:t>Identify the null (H0) and alternative (Ha) hypotheses.</a:t>
+            </a:r>
+            <a:r>
+              <a:rPr lang="en-US" b="1" dirty="0"/>
+              <a:t> </a:t>
+            </a:r>
+            <a:r>
+              <a:rPr lang="en-US" dirty="0"/>
+              <a:t>H0: Beach Comber patrons' ages are, on average, equal to 21. Ha: Beach Comber patrons' ages are, on average, not equal to 21. </a:t>
             </a:r>
           </a:p>
           <a:p>
@@ -6063,7 +6065,7 @@
             </a:r>
             <a:r>
               <a:rPr lang="en-US" dirty="0"/>
-              <a:t>: Since the p-value (0.01622) is &lt; the alpha (0.025), we fail to reject the null hypothesis.</a:t>
+              <a:t>: Since the p-value (0.01622) is &lt; the alpha (0.025), we reject the null hypothesis.</a:t>
             </a:r>
           </a:p>
           <a:p>
@@ -6081,7 +6083,7 @@
             </a:r>
             <a:r>
               <a:rPr lang="en-US" dirty="0"/>
-              <a:t> There is insufficient evidence to suggest (p-value 0.01622) that the mean age of patrons is different than 21.</a:t>
+              <a:t> There is sufficient evidence to suggest (p-value 0.01622) that the mean age of patrons is different than 21.</a:t>
             </a:r>
           </a:p>
         </p:txBody>
@@ -7322,35 +7324,6 @@
 </file>
 
 <file path=customXml/item1.xml><?xml version="1.0" encoding="utf-8"?>
-<?mso-contentType ?>
-<FormTemplates xmlns="http://schemas.microsoft.com/sharepoint/v3/contenttype/forms">
-  <Display>DocumentLibraryForm</Display>
-  <Edit>DocumentLibraryForm</Edit>
-  <New>DocumentLibraryForm</New>
-</FormTemplates>
-</file>
-
-<file path=customXml/item2.xml><?xml version="1.0" encoding="utf-8"?>
-<p:properties xmlns:p="http://schemas.microsoft.com/office/2006/metadata/properties" xmlns:xsi="http://www.w3.org/2001/XMLSchema-instance" xmlns:pc="http://schemas.microsoft.com/office/infopath/2007/PartnerControls">
-  <documentManagement>
-    <Background xmlns="71af3243-3dd4-4a8d-8c0d-dd76da1f02a5">false</Background>
-    <Status xmlns="71af3243-3dd4-4a8d-8c0d-dd76da1f02a5">Not started</Status>
-    <_ip_UnifiedCompliancePolicyUIAction xmlns="http://schemas.microsoft.com/sharepoint/v3" xsi:nil="true"/>
-    <Image xmlns="71af3243-3dd4-4a8d-8c0d-dd76da1f02a5">
-      <Url xsi:nil="true"/>
-      <Description xsi:nil="true"/>
-    </Image>
-    <_ip_UnifiedCompliancePolicyProperties xmlns="http://schemas.microsoft.com/sharepoint/v3" xsi:nil="true"/>
-    <ImageTagsTaxHTField xmlns="71af3243-3dd4-4a8d-8c0d-dd76da1f02a5">
-      <Terms xmlns="http://schemas.microsoft.com/office/infopath/2007/PartnerControls"/>
-    </ImageTagsTaxHTField>
-    <TaxCatchAll xmlns="230e9df3-be65-4c73-a93b-d1236ebd677e" xsi:nil="true"/>
-    <MediaServiceKeyPoints xmlns="71af3243-3dd4-4a8d-8c0d-dd76da1f02a5" xsi:nil="true"/>
-  </documentManagement>
-</p:properties>
-</file>
-
-<file path=customXml/item3.xml><?xml version="1.0" encoding="utf-8"?>
 <ct:contentTypeSchema xmlns:ct="http://schemas.microsoft.com/office/2006/metadata/contentType" xmlns:ma="http://schemas.microsoft.com/office/2006/metadata/properties/metaAttributes" ct:_="" ma:_="" ma:contentTypeName="Document" ma:contentTypeID="0x01010079F111ED35F8CC479449609E8A0923A6" ma:contentTypeVersion="24" ma:contentTypeDescription="Create a new document." ma:contentTypeScope="" ma:versionID="2d714a3296df14eba7a100bb665443ca">
   <xsd:schema xmlns:xsd="http://www.w3.org/2001/XMLSchema" xmlns:xs="http://www.w3.org/2001/XMLSchema" xmlns:p="http://schemas.microsoft.com/office/2006/metadata/properties" xmlns:ns1="http://schemas.microsoft.com/sharepoint/v3" xmlns:ns2="71af3243-3dd4-4a8d-8c0d-dd76da1f02a5" xmlns:ns3="16c05727-aa75-4e4a-9b5f-8a80a1165891" xmlns:ns4="230e9df3-be65-4c73-a93b-d1236ebd677e" targetNamespace="http://schemas.microsoft.com/office/2006/metadata/properties" ma:root="true" ma:fieldsID="49549bf45bfbbfb6cffed527380e77e1" ns1:_="" ns2:_="" ns3:_="" ns4:_="">
     <xsd:import namespace="http://schemas.microsoft.com/sharepoint/v3"/>
@@ -7638,27 +7611,36 @@
 </ct:contentTypeSchema>
 </file>
 
-<file path=customXml/itemProps1.xml><?xml version="1.0" encoding="utf-8"?>
-<ds:datastoreItem xmlns:ds="http://schemas.openxmlformats.org/officeDocument/2006/customXml" ds:itemID="{6FB6FBE4-5ACD-4115-9139-635E82C3D35A}">
-  <ds:schemaRefs>
-    <ds:schemaRef ds:uri="http://schemas.microsoft.com/sharepoint/v3/contenttype/forms"/>
-  </ds:schemaRefs>
-</ds:datastoreItem>
+<file path=customXml/item2.xml><?xml version="1.0" encoding="utf-8"?>
+<p:properties xmlns:p="http://schemas.microsoft.com/office/2006/metadata/properties" xmlns:xsi="http://www.w3.org/2001/XMLSchema-instance" xmlns:pc="http://schemas.microsoft.com/office/infopath/2007/PartnerControls">
+  <documentManagement>
+    <Background xmlns="71af3243-3dd4-4a8d-8c0d-dd76da1f02a5">false</Background>
+    <Status xmlns="71af3243-3dd4-4a8d-8c0d-dd76da1f02a5">Not started</Status>
+    <_ip_UnifiedCompliancePolicyUIAction xmlns="http://schemas.microsoft.com/sharepoint/v3" xsi:nil="true"/>
+    <Image xmlns="71af3243-3dd4-4a8d-8c0d-dd76da1f02a5">
+      <Url xsi:nil="true"/>
+      <Description xsi:nil="true"/>
+    </Image>
+    <_ip_UnifiedCompliancePolicyProperties xmlns="http://schemas.microsoft.com/sharepoint/v3" xsi:nil="true"/>
+    <ImageTagsTaxHTField xmlns="71af3243-3dd4-4a8d-8c0d-dd76da1f02a5">
+      <Terms xmlns="http://schemas.microsoft.com/office/infopath/2007/PartnerControls"/>
+    </ImageTagsTaxHTField>
+    <TaxCatchAll xmlns="230e9df3-be65-4c73-a93b-d1236ebd677e" xsi:nil="true"/>
+    <MediaServiceKeyPoints xmlns="71af3243-3dd4-4a8d-8c0d-dd76da1f02a5" xsi:nil="true"/>
+  </documentManagement>
+</p:properties>
 </file>
 
-<file path=customXml/itemProps2.xml><?xml version="1.0" encoding="utf-8"?>
-<ds:datastoreItem xmlns:ds="http://schemas.openxmlformats.org/officeDocument/2006/customXml" ds:itemID="{A7EFEE82-03DD-4F90-81E2-2AF29E1D81FB}">
-  <ds:schemaRefs>
-    <ds:schemaRef ds:uri="http://schemas.microsoft.com/office/2006/metadata/properties"/>
-    <ds:schemaRef ds:uri="http://schemas.microsoft.com/office/infopath/2007/PartnerControls"/>
-    <ds:schemaRef ds:uri="71af3243-3dd4-4a8d-8c0d-dd76da1f02a5"/>
-    <ds:schemaRef ds:uri="http://schemas.microsoft.com/sharepoint/v3"/>
-    <ds:schemaRef ds:uri="230e9df3-be65-4c73-a93b-d1236ebd677e"/>
-  </ds:schemaRefs>
-</ds:datastoreItem>
+<file path=customXml/item3.xml><?xml version="1.0" encoding="utf-8"?>
+<?mso-contentType ?>
+<FormTemplates xmlns="http://schemas.microsoft.com/sharepoint/v3/contenttype/forms">
+  <Display>DocumentLibraryForm</Display>
+  <Edit>DocumentLibraryForm</Edit>
+  <New>DocumentLibraryForm</New>
+</FormTemplates>
 </file>
 
-<file path=customXml/itemProps3.xml><?xml version="1.0" encoding="utf-8"?>
+<file path=customXml/itemProps1.xml><?xml version="1.0" encoding="utf-8"?>
 <ds:datastoreItem xmlns:ds="http://schemas.openxmlformats.org/officeDocument/2006/customXml" ds:itemID="{D7E109C5-7A21-42A3-B17A-36E7B8E5EFE4}">
   <ds:schemaRefs>
     <ds:schemaRef ds:uri="http://schemas.microsoft.com/office/2006/metadata/contentType"/>
@@ -7679,6 +7661,26 @@
 </ds:datastoreItem>
 </file>
 
+<file path=customXml/itemProps2.xml><?xml version="1.0" encoding="utf-8"?>
+<ds:datastoreItem xmlns:ds="http://schemas.openxmlformats.org/officeDocument/2006/customXml" ds:itemID="{A7EFEE82-03DD-4F90-81E2-2AF29E1D81FB}">
+  <ds:schemaRefs>
+    <ds:schemaRef ds:uri="http://schemas.microsoft.com/office/2006/metadata/properties"/>
+    <ds:schemaRef ds:uri="http://schemas.microsoft.com/office/infopath/2007/PartnerControls"/>
+    <ds:schemaRef ds:uri="71af3243-3dd4-4a8d-8c0d-dd76da1f02a5"/>
+    <ds:schemaRef ds:uri="http://schemas.microsoft.com/sharepoint/v3"/>
+    <ds:schemaRef ds:uri="230e9df3-be65-4c73-a93b-d1236ebd677e"/>
+  </ds:schemaRefs>
+</ds:datastoreItem>
+</file>
+
+<file path=customXml/itemProps3.xml><?xml version="1.0" encoding="utf-8"?>
+<ds:datastoreItem xmlns:ds="http://schemas.openxmlformats.org/officeDocument/2006/customXml" ds:itemID="{6FB6FBE4-5ACD-4115-9139-635E82C3D35A}">
+  <ds:schemaRefs>
+    <ds:schemaRef ds:uri="http://schemas.microsoft.com/sharepoint/v3/contenttype/forms"/>
+  </ds:schemaRefs>
+</ds:datastoreItem>
+</file>
+
 <file path=docMetadata/LabelInfo.xml><?xml version="1.0" encoding="utf-8"?>
 <clbl:labelList xmlns:clbl="http://schemas.microsoft.com/office/2020/mipLabelMetadata"/>
 </file>
</xml_diff>